<commit_message>
Actualizacion de la presentacion 7
</commit_message>
<xml_diff>
--- a/Presentaciones/Presentacion_Fundamentos_2016_007_N.pptx
+++ b/Presentaciones/Presentacion_Fundamentos_2016_007_N.pptx
@@ -127,7 +127,7 @@
   </p:defaultTextStyle>
   <p:extLst>
     <p:ext uri="{EFAFB233-063F-42B5-8137-9DF3F51BA10A}">
-      <p15:sldGuideLst xmlns:p15="http://schemas.microsoft.com/office/powerpoint/2012/main" xmlns="">
+      <p15:sldGuideLst xmlns="" xmlns:p15="http://schemas.microsoft.com/office/powerpoint/2012/main">
         <p15:guide id="1" orient="horz" pos="2160">
           <p15:clr>
             <a:srgbClr val="A4A3A4"/>
@@ -141,7 +141,7 @@
       </p15:sldGuideLst>
     </p:ext>
     <p:ext uri="{2D200454-40CA-4A62-9FC3-DE9A4176ACB9}">
-      <p15:notesGuideLst xmlns:p15="http://schemas.microsoft.com/office/powerpoint/2012/main" xmlns="">
+      <p15:notesGuideLst xmlns="" xmlns:p15="http://schemas.microsoft.com/office/powerpoint/2012/main">
         <p15:guide id="1" orient="horz" pos="2880">
           <p15:clr>
             <a:srgbClr val="A4A3A4"/>
@@ -10524,36 +10524,6 @@
           <a:chExt cx="0" cy="0"/>
         </a:xfrm>
       </p:grpSpPr>
-      <p:pic>
-        <p:nvPicPr>
-          <p:cNvPr id="12" name="Picture 11"/>
-          <p:cNvPicPr>
-            <a:picLocks noChangeAspect="1"/>
-          </p:cNvPicPr>
-          <p:nvPr/>
-        </p:nvPicPr>
-        <p:blipFill>
-          <a:blip r:embed="rId2">
-            <a:extLst>
-              <a:ext uri="{28A0092B-C50C-407E-A947-70E740481C1C}">
-                <a14:useLocalDpi xmlns:a14="http://schemas.microsoft.com/office/drawing/2010/main" val="0"/>
-              </a:ext>
-            </a:extLst>
-          </a:blip>
-          <a:stretch>
-            <a:fillRect/>
-          </a:stretch>
-        </p:blipFill>
-        <p:spPr>
-          <a:xfrm>
-            <a:off x="457200" y="1307849"/>
-            <a:ext cx="3817987" cy="2808634"/>
-          </a:xfrm>
-          <a:prstGeom prst="rect">
-            <a:avLst/>
-          </a:prstGeom>
-        </p:spPr>
-      </p:pic>
       <p:sp>
         <p:nvSpPr>
           <p:cNvPr id="2" name="Title 1"/>
@@ -10586,7 +10556,7 @@
           <p:nvPr/>
         </p:nvPicPr>
         <p:blipFill>
-          <a:blip r:embed="rId3">
+          <a:blip r:embed="rId2">
             <a:extLst>
               <a:ext uri="{28A0092B-C50C-407E-A947-70E740481C1C}">
                 <a14:useLocalDpi xmlns:a14="http://schemas.microsoft.com/office/drawing/2010/main" val="0"/>
@@ -10650,7 +10620,7 @@
           <p:nvPr/>
         </p:nvPicPr>
         <p:blipFill>
-          <a:blip r:embed="rId4">
+          <a:blip r:embed="rId3">
             <a:extLst>
               <a:ext uri="{28A0092B-C50C-407E-A947-70E740481C1C}">
                 <a14:useLocalDpi xmlns:a14="http://schemas.microsoft.com/office/drawing/2010/main" val="0"/>
@@ -10703,6 +10673,36 @@
               </a14:hiddenEffects>
             </a:ext>
           </a:extLst>
+        </p:spPr>
+      </p:pic>
+      <p:pic>
+        <p:nvPicPr>
+          <p:cNvPr id="3" name="Picture 2"/>
+          <p:cNvPicPr>
+            <a:picLocks noChangeAspect="1"/>
+          </p:cNvPicPr>
+          <p:nvPr/>
+        </p:nvPicPr>
+        <p:blipFill>
+          <a:blip r:embed="rId4">
+            <a:extLst>
+              <a:ext uri="{28A0092B-C50C-407E-A947-70E740481C1C}">
+                <a14:useLocalDpi xmlns:a14="http://schemas.microsoft.com/office/drawing/2010/main" val="0"/>
+              </a:ext>
+            </a:extLst>
+          </a:blip>
+          <a:stretch>
+            <a:fillRect/>
+          </a:stretch>
+        </p:blipFill>
+        <p:spPr>
+          <a:xfrm>
+            <a:off x="681236" y="1647338"/>
+            <a:ext cx="3314700" cy="2438400"/>
+          </a:xfrm>
+          <a:prstGeom prst="rect">
+            <a:avLst/>
+          </a:prstGeom>
         </p:spPr>
       </p:pic>
       <p:cxnSp>

</xml_diff>